<commit_message>
Dotjerana prezentacija još malo.
</commit_message>
<xml_diff>
--- a/Presentation/Razvoj rješenja za predviđanje broja osoba u prostoriji.pptx
+++ b/Presentation/Razvoj rješenja za predviđanje broja osoba u prostoriji.pptx
@@ -11,7 +11,7 @@
     <p:sldId id="258" r:id="rId2"/>
     <p:sldId id="269" r:id="rId3"/>
     <p:sldId id="272" r:id="rId4"/>
-    <p:sldId id="285" r:id="rId5"/>
+    <p:sldId id="287" r:id="rId5"/>
     <p:sldId id="274" r:id="rId6"/>
     <p:sldId id="275" r:id="rId7"/>
     <p:sldId id="276" r:id="rId8"/>
@@ -1755,7 +1755,7 @@
     </p:spTree>
     <p:extLst>
       <p:ext uri="{BB962C8B-B14F-4D97-AF65-F5344CB8AC3E}">
-        <p14:creationId xmlns:p14="http://schemas.microsoft.com/office/powerpoint/2010/main" val="3061615922"/>
+        <p14:creationId xmlns:p14="http://schemas.microsoft.com/office/powerpoint/2010/main" val="4072671021"/>
       </p:ext>
     </p:extLst>
   </p:cSld>
@@ -6164,109 +6164,7 @@
         <p:spPr>
           <a:xfrm>
             <a:off x="1066800" y="44335"/>
-            <a:ext cx="10058400" cy="2509395"/>
-          </a:xfrm>
-          <a:prstGeom prst="rect">
-            <a:avLst/>
-          </a:prstGeom>
-        </p:spPr>
-        <p:txBody>
-          <a:bodyPr vert="horz" lIns="91440" tIns="45720" rIns="91440" bIns="45720" rtlCol="0" anchor="b">
-            <a:normAutofit lnSpcReduction="10000"/>
-          </a:bodyPr>
-          <a:lstStyle>
-            <a:lvl1pPr marL="0" algn="l" defTabSz="914400" rtl="0" eaLnBrk="1" latinLnBrk="0" hangingPunct="1">
-              <a:lnSpc>
-                <a:spcPct val="85000"/>
-              </a:lnSpc>
-              <a:spcBef>
-                <a:spcPct val="0"/>
-              </a:spcBef>
-              <a:buNone/>
-              <a:defRPr sz="4800" kern="1200" spc="-50" baseline="0">
-                <a:solidFill>
-                  <a:schemeClr val="tx1">
-                    <a:lumMod val="75000"/>
-                    <a:lumOff val="25000"/>
-                  </a:schemeClr>
-                </a:solidFill>
-                <a:latin typeface="+mj-lt"/>
-                <a:ea typeface="+mj-ea"/>
-                <a:cs typeface="+mj-cs"/>
-              </a:defRPr>
-            </a:lvl1pPr>
-          </a:lstStyle>
-          <a:p>
-            <a:pPr algn="ctr"/>
-            <a:r>
-              <a:rPr lang="ru-RU" sz="3200" b="1" dirty="0">
-                <a:latin typeface="Times New Roman" panose="02020603050405020304" pitchFamily="18" charset="0"/>
-                <a:cs typeface="Times New Roman" panose="02020603050405020304" pitchFamily="18" charset="0"/>
-              </a:rPr>
-              <a:t>УНИВЕРЗИТЕТ У БАЊОЈ ЛУЦИ</a:t>
-            </a:r>
-          </a:p>
-          <a:p>
-            <a:pPr algn="ctr"/>
-            <a:r>
-              <a:rPr lang="ru-RU" sz="3200" b="1" dirty="0">
-                <a:latin typeface="Times New Roman" panose="02020603050405020304" pitchFamily="18" charset="0"/>
-                <a:cs typeface="Times New Roman" panose="02020603050405020304" pitchFamily="18" charset="0"/>
-              </a:rPr>
-              <a:t>ЕЛЕКТРОТЕХНИЧКИ ФАКУЛТЕТ</a:t>
-            </a:r>
-          </a:p>
-          <a:p>
-            <a:pPr algn="ctr"/>
-            <a:endParaRPr lang="sr-Cyrl-BA" sz="3200" b="1" dirty="0">
-              <a:latin typeface="Times New Roman" panose="02020603050405020304" pitchFamily="18" charset="0"/>
-              <a:cs typeface="Times New Roman" panose="02020603050405020304" pitchFamily="18" charset="0"/>
-            </a:endParaRPr>
-          </a:p>
-          <a:p>
-            <a:pPr algn="ctr"/>
-            <a:endParaRPr lang="sr-Cyrl-BA" sz="3200" b="1" dirty="0">
-              <a:latin typeface="Times New Roman" panose="02020603050405020304" pitchFamily="18" charset="0"/>
-              <a:cs typeface="Times New Roman" panose="02020603050405020304" pitchFamily="18" charset="0"/>
-            </a:endParaRPr>
-          </a:p>
-          <a:p>
-            <a:pPr algn="ctr"/>
-            <a:endParaRPr lang="sr-Cyrl-BA" sz="3200" b="1" dirty="0">
-              <a:latin typeface="Times New Roman" panose="02020603050405020304" pitchFamily="18" charset="0"/>
-              <a:cs typeface="Times New Roman" panose="02020603050405020304" pitchFamily="18" charset="0"/>
-            </a:endParaRPr>
-          </a:p>
-          <a:p>
-            <a:pPr algn="ctr"/>
-            <a:r>
-              <a:rPr lang="sr-Cyrl-BA" sz="3200" b="1" dirty="0">
-                <a:latin typeface="Times New Roman" panose="02020603050405020304" pitchFamily="18" charset="0"/>
-                <a:cs typeface="Times New Roman" panose="02020603050405020304" pitchFamily="18" charset="0"/>
-              </a:rPr>
-              <a:t>Никола Карпић</a:t>
-            </a:r>
-          </a:p>
-        </p:txBody>
-      </p:sp>
-      <p:sp>
-        <p:nvSpPr>
-          <p:cNvPr id="6" name="Title 1">
-            <a:extLst>
-              <a:ext uri="{FF2B5EF4-FFF2-40B4-BE49-F238E27FC236}">
-                <a16:creationId xmlns:a16="http://schemas.microsoft.com/office/drawing/2014/main" id="{38786D33-6002-232E-616C-4C51E28E2D38}"/>
-              </a:ext>
-            </a:extLst>
-          </p:cNvPr>
-          <p:cNvSpPr txBox="1">
-            <a:spLocks/>
-          </p:cNvSpPr>
-          <p:nvPr/>
-        </p:nvSpPr>
-        <p:spPr>
-          <a:xfrm>
-            <a:off x="4115212" y="5530962"/>
-            <a:ext cx="3961576" cy="635427"/>
+            <a:ext cx="10058400" cy="2684716"/>
           </a:xfrm>
           <a:prstGeom prst="rect">
             <a:avLst/>
@@ -6299,28 +6197,45 @@
             </a:lvl1pPr>
           </a:lstStyle>
           <a:p>
-            <a:r>
-              <a:rPr lang="sr-Cyrl-BA" sz="3200" b="1" dirty="0">
-                <a:latin typeface="Times New Roman" panose="02020603050405020304" pitchFamily="18" charset="0"/>
-                <a:cs typeface="Times New Roman" panose="02020603050405020304" pitchFamily="18" charset="0"/>
-              </a:rPr>
-              <a:t>Бања Лука</a:t>
-            </a:r>
-            <a:r>
-              <a:rPr lang="sr-Cyrl-BA" sz="3200" b="1">
-                <a:latin typeface="Times New Roman" panose="02020603050405020304" pitchFamily="18" charset="0"/>
-                <a:cs typeface="Times New Roman" panose="02020603050405020304" pitchFamily="18" charset="0"/>
-              </a:rPr>
-              <a:t>, јул </a:t>
-            </a:r>
-            <a:r>
-              <a:rPr lang="sr-Cyrl-BA" sz="3200" b="1" dirty="0">
-                <a:latin typeface="Times New Roman" panose="02020603050405020304" pitchFamily="18" charset="0"/>
-                <a:cs typeface="Times New Roman" panose="02020603050405020304" pitchFamily="18" charset="0"/>
-              </a:rPr>
-              <a:t>2024.</a:t>
-            </a:r>
-            <a:endParaRPr lang="sr-Latn-BA" sz="3200" dirty="0"/>
+            <a:pPr algn="ctr"/>
+            <a:r>
+              <a:rPr lang="ru-RU" sz="3200" b="1" dirty="0">
+                <a:latin typeface="Times New Roman" panose="02020603050405020304" pitchFamily="18" charset="0"/>
+                <a:cs typeface="Times New Roman" panose="02020603050405020304" pitchFamily="18" charset="0"/>
+              </a:rPr>
+              <a:t>УНИВЕРЗИТЕТ У БАЊОЈ ЛУЦИ</a:t>
+            </a:r>
+          </a:p>
+          <a:p>
+            <a:pPr algn="ctr"/>
+            <a:r>
+              <a:rPr lang="ru-RU" sz="3200" b="1" dirty="0">
+                <a:latin typeface="Times New Roman" panose="02020603050405020304" pitchFamily="18" charset="0"/>
+                <a:cs typeface="Times New Roman" panose="02020603050405020304" pitchFamily="18" charset="0"/>
+              </a:rPr>
+              <a:t>ЕЛЕКТРОТЕХНИЧКИ ФАКУЛТЕТ</a:t>
+            </a:r>
+            <a:endParaRPr lang="sr-Cyrl-BA" sz="3200" b="1" dirty="0">
+              <a:latin typeface="Times New Roman" panose="02020603050405020304" pitchFamily="18" charset="0"/>
+              <a:cs typeface="Times New Roman" panose="02020603050405020304" pitchFamily="18" charset="0"/>
+            </a:endParaRPr>
+          </a:p>
+          <a:p>
+            <a:pPr algn="ctr"/>
+            <a:endParaRPr lang="sr-Cyrl-BA" sz="5400" b="1" dirty="0">
+              <a:latin typeface="Times New Roman" panose="02020603050405020304" pitchFamily="18" charset="0"/>
+              <a:cs typeface="Times New Roman" panose="02020603050405020304" pitchFamily="18" charset="0"/>
+            </a:endParaRPr>
+          </a:p>
+          <a:p>
+            <a:pPr algn="ctr"/>
+            <a:r>
+              <a:rPr lang="sr-Cyrl-BA" b="1" dirty="0">
+                <a:latin typeface="Times New Roman" panose="02020603050405020304" pitchFamily="18" charset="0"/>
+                <a:cs typeface="Times New Roman" panose="02020603050405020304" pitchFamily="18" charset="0"/>
+              </a:rPr>
+              <a:t>Дипломски рад:</a:t>
+            </a:r>
           </a:p>
         </p:txBody>
       </p:sp>
@@ -6400,6 +6315,105 @@
           </a:fontRef>
         </p:style>
       </p:cxnSp>
+      <p:sp>
+        <p:nvSpPr>
+          <p:cNvPr id="3" name="Title 1">
+            <a:extLst>
+              <a:ext uri="{FF2B5EF4-FFF2-40B4-BE49-F238E27FC236}">
+                <a16:creationId xmlns:a16="http://schemas.microsoft.com/office/drawing/2014/main" id="{38786D33-6002-232E-616C-4C51E28E2D38}"/>
+              </a:ext>
+            </a:extLst>
+          </p:cNvPr>
+          <p:cNvSpPr txBox="1">
+            <a:spLocks/>
+          </p:cNvSpPr>
+          <p:nvPr/>
+        </p:nvSpPr>
+        <p:spPr>
+          <a:xfrm>
+            <a:off x="1103871" y="4428734"/>
+            <a:ext cx="9984259" cy="1737656"/>
+          </a:xfrm>
+          <a:prstGeom prst="rect">
+            <a:avLst/>
+          </a:prstGeom>
+        </p:spPr>
+        <p:txBody>
+          <a:bodyPr vert="horz" lIns="91440" tIns="45720" rIns="91440" bIns="45720" rtlCol="0" anchor="b">
+            <a:normAutofit fontScale="92500" lnSpcReduction="10000"/>
+          </a:bodyPr>
+          <a:lstStyle>
+            <a:lvl1pPr marL="0" algn="l" defTabSz="914400" rtl="0" eaLnBrk="1" latinLnBrk="0" hangingPunct="1">
+              <a:lnSpc>
+                <a:spcPct val="85000"/>
+              </a:lnSpc>
+              <a:spcBef>
+                <a:spcPct val="0"/>
+              </a:spcBef>
+              <a:buNone/>
+              <a:defRPr sz="4800" kern="1200" spc="-50" baseline="0">
+                <a:solidFill>
+                  <a:schemeClr val="tx1">
+                    <a:lumMod val="75000"/>
+                    <a:lumOff val="25000"/>
+                  </a:schemeClr>
+                </a:solidFill>
+                <a:latin typeface="+mj-lt"/>
+                <a:ea typeface="+mj-ea"/>
+                <a:cs typeface="+mj-cs"/>
+              </a:defRPr>
+            </a:lvl1pPr>
+          </a:lstStyle>
+          <a:p>
+            <a:endParaRPr lang="sr-Cyrl-BA" sz="3200" b="1" dirty="0">
+              <a:latin typeface="Times New Roman" panose="02020603050405020304" pitchFamily="18" charset="0"/>
+              <a:cs typeface="Times New Roman" panose="02020603050405020304" pitchFamily="18" charset="0"/>
+            </a:endParaRPr>
+          </a:p>
+          <a:p>
+            <a:pPr algn="ctr"/>
+            <a:r>
+              <a:rPr lang="sr-Cyrl-BA" sz="3500" b="1" dirty="0">
+                <a:latin typeface="Times New Roman" panose="02020603050405020304" pitchFamily="18" charset="0"/>
+                <a:cs typeface="Times New Roman" panose="02020603050405020304" pitchFamily="18" charset="0"/>
+              </a:rPr>
+              <a:t>Студент: Никола Карпић</a:t>
+            </a:r>
+            <a:endParaRPr lang="sr-Latn-BA" sz="3500" b="1" dirty="0">
+              <a:latin typeface="Times New Roman" panose="02020603050405020304" pitchFamily="18" charset="0"/>
+              <a:cs typeface="Times New Roman" panose="02020603050405020304" pitchFamily="18" charset="0"/>
+            </a:endParaRPr>
+          </a:p>
+          <a:p>
+            <a:pPr algn="ctr"/>
+            <a:r>
+              <a:rPr lang="ru-RU" sz="3500" b="1" dirty="0">
+                <a:latin typeface="Times New Roman" panose="02020603050405020304" pitchFamily="18" charset="0"/>
+                <a:cs typeface="Times New Roman" panose="02020603050405020304" pitchFamily="18" charset="0"/>
+              </a:rPr>
+              <a:t>Ментор: проф. др Зоран Ђурић</a:t>
+            </a:r>
+          </a:p>
+          <a:p>
+            <a:pPr algn="ctr"/>
+            <a:endParaRPr lang="sr-Cyrl-BA" sz="1700" b="1" dirty="0">
+              <a:latin typeface="Times New Roman" panose="02020603050405020304" pitchFamily="18" charset="0"/>
+              <a:cs typeface="Times New Roman" panose="02020603050405020304" pitchFamily="18" charset="0"/>
+            </a:endParaRPr>
+          </a:p>
+          <a:p>
+            <a:pPr algn="ctr"/>
+            <a:r>
+              <a:rPr lang="sr-Cyrl-BA" sz="3200" b="1" dirty="0">
+                <a:latin typeface="Times New Roman" panose="02020603050405020304" pitchFamily="18" charset="0"/>
+                <a:cs typeface="Times New Roman" panose="02020603050405020304" pitchFamily="18" charset="0"/>
+              </a:rPr>
+              <a:t>Бања Лука, јул 2024.</a:t>
+            </a:r>
+            <a:endParaRPr lang="sr-Latn-BA" sz="3200" dirty="0"/>
+          </a:p>
+        </p:txBody>
+      </p:sp>
     </p:spTree>
     <p:extLst>
       <p:ext uri="{BB962C8B-B14F-4D97-AF65-F5344CB8AC3E}">
@@ -12438,10 +12452,10 @@
       </p:grpSpPr>
       <p:sp>
         <p:nvSpPr>
-          <p:cNvPr id="15" name="Rectangle 14">
+          <p:cNvPr id="11" name="Rectangle 10">
             <a:extLst>
               <a:ext uri="{FF2B5EF4-FFF2-40B4-BE49-F238E27FC236}">
-                <a16:creationId xmlns:a16="http://schemas.microsoft.com/office/drawing/2014/main" id="{BB2B8762-61F0-4F1B-9364-D633EE9D6AF5}"/>
+                <a16:creationId xmlns:a16="http://schemas.microsoft.com/office/drawing/2014/main" id="{4E4490D0-3672-446A-AC12-B4830333BDDD}"/>
               </a:ext>
               <a:ext uri="{C183D7F6-B498-43B3-948B-1728B52AA6E4}">
                 <adec:decorative xmlns:adec="http://schemas.microsoft.com/office/drawing/2017/decorative" val="1"/>
@@ -12500,10 +12514,10 @@
       </p:sp>
       <p:sp>
         <p:nvSpPr>
-          <p:cNvPr id="17" name="Rectangle 16">
+          <p:cNvPr id="13" name="Rectangle 12">
             <a:extLst>
               <a:ext uri="{FF2B5EF4-FFF2-40B4-BE49-F238E27FC236}">
-                <a16:creationId xmlns:a16="http://schemas.microsoft.com/office/drawing/2014/main" id="{E97675C8-1328-460C-9EBF-6B446B67EAD3}"/>
+                <a16:creationId xmlns:a16="http://schemas.microsoft.com/office/drawing/2014/main" id="{39CB82C2-DF65-4EC1-8280-F201D50F570B}"/>
               </a:ext>
               <a:ext uri="{C183D7F6-B498-43B3-948B-1728B52AA6E4}">
                 <adec:decorative xmlns:adec="http://schemas.microsoft.com/office/drawing/2017/decorative" val="1"/>
@@ -12562,10 +12576,10 @@
       </p:sp>
       <p:cxnSp>
         <p:nvCxnSpPr>
-          <p:cNvPr id="19" name="Straight Connector 18">
+          <p:cNvPr id="15" name="Straight Connector 14">
             <a:extLst>
               <a:ext uri="{FF2B5EF4-FFF2-40B4-BE49-F238E27FC236}">
-                <a16:creationId xmlns:a16="http://schemas.microsoft.com/office/drawing/2014/main" id="{514EE78B-AF71-4195-A01B-F1165D9233BF}"/>
+                <a16:creationId xmlns:a16="http://schemas.microsoft.com/office/drawing/2014/main" id="{7E1D4427-852B-4B37-8E76-0E9F1810BA2A}"/>
               </a:ext>
               <a:ext uri="{C183D7F6-B498-43B3-948B-1728B52AA6E4}">
                 <adec:decorative xmlns:adec="http://schemas.microsoft.com/office/drawing/2017/decorative" val="1"/>
@@ -12617,10 +12631,10 @@
       </p:cxnSp>
       <p:sp useBgFill="1">
         <p:nvSpPr>
-          <p:cNvPr id="21" name="Rectangle 20">
+          <p:cNvPr id="17" name="Rectangle 16">
             <a:extLst>
               <a:ext uri="{FF2B5EF4-FFF2-40B4-BE49-F238E27FC236}">
-                <a16:creationId xmlns:a16="http://schemas.microsoft.com/office/drawing/2014/main" id="{C6417104-D4C1-4710-9982-2154A7F48492}"/>
+                <a16:creationId xmlns:a16="http://schemas.microsoft.com/office/drawing/2014/main" id="{FA4CD5CB-D209-4D70-8CA4-629731C59219}"/>
               </a:ext>
               <a:ext uri="{C183D7F6-B498-43B3-948B-1728B52AA6E4}">
                 <adec:decorative xmlns:adec="http://schemas.microsoft.com/office/drawing/2017/decorative" val="1"/>
@@ -12677,19 +12691,125 @@
       </p:sp>
       <p:sp>
         <p:nvSpPr>
-          <p:cNvPr id="23" name="Rectangle 22">
+          <p:cNvPr id="2" name="Title 1">
             <a:extLst>
               <a:ext uri="{FF2B5EF4-FFF2-40B4-BE49-F238E27FC236}">
-                <a16:creationId xmlns:a16="http://schemas.microsoft.com/office/drawing/2014/main" id="{626F1402-2DEC-4071-84AF-350C7BF00D43}"/>
+                <a16:creationId xmlns:a16="http://schemas.microsoft.com/office/drawing/2014/main" id="{9F719474-1991-7B37-AFE1-0CF4B47D90AB}"/>
+              </a:ext>
+            </a:extLst>
+          </p:cNvPr>
+          <p:cNvSpPr>
+            <a:spLocks noGrp="1"/>
+          </p:cNvSpPr>
+          <p:nvPr>
+            <p:ph type="title"/>
+          </p:nvPr>
+        </p:nvSpPr>
+        <p:spPr>
+          <a:xfrm>
+            <a:off x="8141110" y="639097"/>
+            <a:ext cx="3401961" cy="3686015"/>
+          </a:xfrm>
+        </p:spPr>
+        <p:txBody>
+          <a:bodyPr vert="horz" lIns="91440" tIns="45720" rIns="91440" bIns="45720" rtlCol="0" anchor="b">
+            <a:normAutofit/>
+          </a:bodyPr>
+          <a:lstStyle/>
+          <a:p>
+            <a:r>
+              <a:rPr lang="sr-Latn-BA" dirty="0">
+                <a:solidFill>
+                  <a:schemeClr val="tx1">
+                    <a:lumMod val="85000"/>
+                    <a:lumOff val="15000"/>
+                  </a:schemeClr>
+                </a:solidFill>
+                <a:latin typeface="Times New Roman" panose="02020603050405020304" pitchFamily="18" charset="0"/>
+                <a:cs typeface="Times New Roman" panose="02020603050405020304" pitchFamily="18" charset="0"/>
+              </a:rPr>
+              <a:t>M</a:t>
+            </a:r>
+            <a:r>
+              <a:rPr lang="en-US" dirty="0" err="1">
+                <a:solidFill>
+                  <a:schemeClr val="tx1">
+                    <a:lumMod val="85000"/>
+                    <a:lumOff val="15000"/>
+                  </a:schemeClr>
+                </a:solidFill>
+                <a:latin typeface="Times New Roman" panose="02020603050405020304" pitchFamily="18" charset="0"/>
+                <a:cs typeface="Times New Roman" panose="02020603050405020304" pitchFamily="18" charset="0"/>
+              </a:rPr>
+              <a:t>ашинско</a:t>
+            </a:r>
+            <a:r>
+              <a:rPr lang="en-US" dirty="0">
+                <a:solidFill>
+                  <a:schemeClr val="tx1">
+                    <a:lumMod val="85000"/>
+                    <a:lumOff val="15000"/>
+                  </a:schemeClr>
+                </a:solidFill>
+                <a:latin typeface="Times New Roman" panose="02020603050405020304" pitchFamily="18" charset="0"/>
+                <a:cs typeface="Times New Roman" panose="02020603050405020304" pitchFamily="18" charset="0"/>
+              </a:rPr>
+              <a:t> </a:t>
+            </a:r>
+            <a:r>
+              <a:rPr lang="en-US" dirty="0" err="1">
+                <a:solidFill>
+                  <a:schemeClr val="tx1">
+                    <a:lumMod val="85000"/>
+                    <a:lumOff val="15000"/>
+                  </a:schemeClr>
+                </a:solidFill>
+                <a:latin typeface="Times New Roman" panose="02020603050405020304" pitchFamily="18" charset="0"/>
+                <a:cs typeface="Times New Roman" panose="02020603050405020304" pitchFamily="18" charset="0"/>
+              </a:rPr>
+              <a:t>учењ</a:t>
+            </a:r>
+            <a:r>
+              <a:rPr lang="sr-Latn-BA" dirty="0">
+                <a:solidFill>
+                  <a:schemeClr val="tx1">
+                    <a:lumMod val="85000"/>
+                    <a:lumOff val="15000"/>
+                  </a:schemeClr>
+                </a:solidFill>
+                <a:latin typeface="Times New Roman" panose="02020603050405020304" pitchFamily="18" charset="0"/>
+                <a:cs typeface="Times New Roman" panose="02020603050405020304" pitchFamily="18" charset="0"/>
+              </a:rPr>
+              <a:t>e</a:t>
+            </a:r>
+            <a:endParaRPr lang="en-US" dirty="0">
+              <a:solidFill>
+                <a:schemeClr val="tx1">
+                  <a:lumMod val="85000"/>
+                  <a:lumOff val="15000"/>
+                </a:schemeClr>
+              </a:solidFill>
+              <a:latin typeface="Times New Roman" panose="02020603050405020304" pitchFamily="18" charset="0"/>
+              <a:cs typeface="Times New Roman" panose="02020603050405020304" pitchFamily="18" charset="0"/>
+            </a:endParaRPr>
+          </a:p>
+        </p:txBody>
+      </p:sp>
+      <p:cxnSp>
+        <p:nvCxnSpPr>
+          <p:cNvPr id="19" name="Straight Connector 18">
+            <a:extLst>
+              <a:ext uri="{FF2B5EF4-FFF2-40B4-BE49-F238E27FC236}">
+                <a16:creationId xmlns:a16="http://schemas.microsoft.com/office/drawing/2014/main" id="{5C6A2BAE-B461-4B55-8E1F-0722ABDD1393}"/>
               </a:ext>
               <a:ext uri="{C183D7F6-B498-43B3-948B-1728B52AA6E4}">
                 <adec:decorative xmlns:adec="http://schemas.microsoft.com/office/drawing/2017/decorative" val="1"/>
               </a:ext>
             </a:extLst>
           </p:cNvPr>
-          <p:cNvSpPr>
-            <a:spLocks noGrp="1" noRot="1" noChangeAspect="1" noMove="1" noResize="1" noEditPoints="1" noAdjustHandles="1" noChangeArrowheads="1" noChangeShapeType="1" noTextEdit="1"/>
-          </p:cNvSpPr>
+          <p:cNvCxnSpPr>
+            <a:cxnSpLocks noGrp="1" noRot="1" noChangeAspect="1" noMove="1" noResize="1" noEditPoints="1" noAdjustHandles="1" noChangeArrowheads="1" noChangeShapeType="1"/>
+          </p:cNvCxnSpPr>
           <p:nvPr>
             <p:extLst>
               <p:ext uri="{386F3935-93C4-4BCD-93E2-E3B085C9AB24}">
@@ -12697,71 +12817,11 @@
               </p:ext>
             </p:extLst>
           </p:nvPr>
-        </p:nvSpPr>
-        <p:spPr>
-          <a:xfrm>
-            <a:off x="6063996" y="886968"/>
-            <a:ext cx="64008" cy="3108960"/>
-          </a:xfrm>
-          <a:prstGeom prst="rect">
-            <a:avLst/>
-          </a:prstGeom>
-          <a:ln>
-            <a:noFill/>
-          </a:ln>
-        </p:spPr>
-        <p:style>
-          <a:lnRef idx="2">
-            <a:schemeClr val="accent1">
-              <a:shade val="50000"/>
-            </a:schemeClr>
-          </a:lnRef>
-          <a:fillRef idx="1">
-            <a:schemeClr val="accent1"/>
-          </a:fillRef>
-          <a:effectRef idx="0">
-            <a:schemeClr val="accent1"/>
-          </a:effectRef>
-          <a:fontRef idx="minor">
-            <a:schemeClr val="lt1"/>
-          </a:fontRef>
-        </p:style>
-        <p:txBody>
-          <a:bodyPr rtlCol="0" anchor="ctr"/>
-          <a:lstStyle/>
-          <a:p>
-            <a:pPr algn="ctr"/>
-            <a:endParaRPr lang="en-US"/>
-          </a:p>
-        </p:txBody>
-      </p:sp>
-      <p:cxnSp>
-        <p:nvCxnSpPr>
-          <p:cNvPr id="25" name="Straight Connector 24">
-            <a:extLst>
-              <a:ext uri="{FF2B5EF4-FFF2-40B4-BE49-F238E27FC236}">
-                <a16:creationId xmlns:a16="http://schemas.microsoft.com/office/drawing/2014/main" id="{04733B62-1719-4677-A612-CA0AC0AD7482}"/>
-              </a:ext>
-              <a:ext uri="{C183D7F6-B498-43B3-948B-1728B52AA6E4}">
-                <adec:decorative xmlns:adec="http://schemas.microsoft.com/office/drawing/2017/decorative" val="1"/>
-              </a:ext>
-            </a:extLst>
-          </p:cNvPr>
-          <p:cNvCxnSpPr>
-            <a:cxnSpLocks noGrp="1" noRot="1" noChangeAspect="1" noMove="1" noResize="1" noEditPoints="1" noAdjustHandles="1" noChangeArrowheads="1" noChangeShapeType="1"/>
-          </p:cNvCxnSpPr>
-          <p:nvPr>
-            <p:extLst>
-              <p:ext uri="{386F3935-93C4-4BCD-93E2-E3B085C9AB24}">
-                <p16:designElem xmlns:p16="http://schemas.microsoft.com/office/powerpoint/2015/main" val="1"/>
-              </p:ext>
-            </p:extLst>
-          </p:nvPr>
         </p:nvCxnSpPr>
         <p:spPr>
           <a:xfrm>
-            <a:off x="721086" y="5618770"/>
-            <a:ext cx="10515600" cy="0"/>
+            <a:off x="8209305" y="4343400"/>
+            <a:ext cx="3200400" cy="0"/>
           </a:xfrm>
           <a:prstGeom prst="line">
             <a:avLst/>
@@ -12791,10 +12851,10 @@
       </p:cxnSp>
       <p:sp>
         <p:nvSpPr>
-          <p:cNvPr id="27" name="Rectangle 26">
+          <p:cNvPr id="21" name="Rectangle 20">
             <a:extLst>
               <a:ext uri="{FF2B5EF4-FFF2-40B4-BE49-F238E27FC236}">
-                <a16:creationId xmlns:a16="http://schemas.microsoft.com/office/drawing/2014/main" id="{DA52A394-10F4-4AA5-90E4-634D1E919DBA}"/>
+                <a16:creationId xmlns:a16="http://schemas.microsoft.com/office/drawing/2014/main" id="{B4C27B90-DF2B-4D00-BA07-18ED774CD2F1}"/>
               </a:ext>
               <a:ext uri="{C183D7F6-B498-43B3-948B-1728B52AA6E4}">
                 <adec:decorative xmlns:adec="http://schemas.microsoft.com/office/drawing/2017/decorative" val="1"/>
@@ -12853,10 +12913,10 @@
       </p:sp>
       <p:sp>
         <p:nvSpPr>
-          <p:cNvPr id="29" name="Rectangle 28">
+          <p:cNvPr id="23" name="Rectangle 22">
             <a:extLst>
               <a:ext uri="{FF2B5EF4-FFF2-40B4-BE49-F238E27FC236}">
-                <a16:creationId xmlns:a16="http://schemas.microsoft.com/office/drawing/2014/main" id="{07BDDC51-8BB2-42BE-8EA8-39B3E9AC1EF6}"/>
+                <a16:creationId xmlns:a16="http://schemas.microsoft.com/office/drawing/2014/main" id="{593ACC25-C262-417A-8AA9-0641C772BDB6}"/>
               </a:ext>
               <a:ext uri="{C183D7F6-B498-43B3-948B-1728B52AA6E4}">
                 <adec:decorative xmlns:adec="http://schemas.microsoft.com/office/drawing/2017/decorative" val="1"/>
@@ -12915,10 +12975,10 @@
       </p:sp>
       <p:pic>
         <p:nvPicPr>
-          <p:cNvPr id="16" name="Content Placeholder 15">
+          <p:cNvPr id="5" name="Content Placeholder 23">
             <a:extLst>
               <a:ext uri="{FF2B5EF4-FFF2-40B4-BE49-F238E27FC236}">
-                <a16:creationId xmlns:a16="http://schemas.microsoft.com/office/drawing/2014/main" id="{F9A041E0-FCC7-44C2-C7A2-41E53D88157C}"/>
+                <a16:creationId xmlns:a16="http://schemas.microsoft.com/office/drawing/2014/main" id="{DF27F6D7-64E4-A0D6-5061-E52DDE497F70}"/>
               </a:ext>
             </a:extLst>
           </p:cNvPr>
@@ -12926,7 +12986,7 @@
             <a:picLocks noGrp="1" noChangeAspect="1"/>
           </p:cNvPicPr>
           <p:nvPr>
-            <p:ph sz="half" idx="2"/>
+            <p:ph sz="half" idx="1"/>
           </p:nvPr>
         </p:nvPicPr>
         <p:blipFill>
@@ -12937,17 +12997,17 @@
         </p:blipFill>
         <p:spPr>
           <a:xfrm>
-            <a:off x="164155" y="734526"/>
-            <a:ext cx="5735686" cy="4246559"/>
+            <a:off x="2960370" y="615582"/>
+            <a:ext cx="5248935" cy="5667329"/>
           </a:xfrm>
         </p:spPr>
       </p:pic>
       <p:pic>
         <p:nvPicPr>
-          <p:cNvPr id="24" name="Content Placeholder 23">
+          <p:cNvPr id="7" name="Content Placeholder 15">
             <a:extLst>
               <a:ext uri="{FF2B5EF4-FFF2-40B4-BE49-F238E27FC236}">
-                <a16:creationId xmlns:a16="http://schemas.microsoft.com/office/drawing/2014/main" id="{D78D9A05-BC36-1D42-A39F-C84A054F60FC}"/>
+                <a16:creationId xmlns:a16="http://schemas.microsoft.com/office/drawing/2014/main" id="{231484DB-6B59-28CA-92DA-C19B3365D1DE}"/>
               </a:ext>
             </a:extLst>
           </p:cNvPr>
@@ -12955,26 +13015,25 @@
             <a:picLocks noGrp="1" noChangeAspect="1"/>
           </p:cNvPicPr>
           <p:nvPr>
-            <p:ph sz="half" idx="1"/>
+            <p:ph sz="half" idx="2"/>
           </p:nvPr>
         </p:nvPicPr>
-        <p:blipFill>
+        <p:blipFill rotWithShape="1">
           <a:blip r:embed="rId4"/>
-          <a:stretch>
-            <a:fillRect/>
-          </a:stretch>
+          <a:srcRect b="16956"/>
+          <a:stretch/>
         </p:blipFill>
         <p:spPr>
           <a:xfrm>
-            <a:off x="6402446" y="207164"/>
-            <a:ext cx="4680732" cy="5053834"/>
+            <a:off x="331470" y="135468"/>
+            <a:ext cx="4609240" cy="2833943"/>
           </a:xfrm>
         </p:spPr>
       </p:pic>
     </p:spTree>
     <p:extLst>
       <p:ext uri="{BB962C8B-B14F-4D97-AF65-F5344CB8AC3E}">
-        <p14:creationId xmlns:p14="http://schemas.microsoft.com/office/powerpoint/2010/main" val="3323879245"/>
+        <p14:creationId xmlns:p14="http://schemas.microsoft.com/office/powerpoint/2010/main" val="3550084692"/>
       </p:ext>
     </p:extLst>
   </p:cSld>

</xml_diff>

<commit_message>
Korekcije govora u prezentaciji.
</commit_message>
<xml_diff>
--- a/Presentation/Razvoj rješenja za predviđanje broja osoba u prostoriji.pptx
+++ b/Presentation/Razvoj rješenja za predviđanje broja osoba u prostoriji.pptx
@@ -215,7 +215,7 @@
           <a:p>
             <a:fld id="{933E0DE9-15DF-4B33-8D15-723B754FA0F6}" type="datetimeFigureOut">
               <a:rPr lang="sr-Latn-BA" smtClean="0"/>
-              <a:t>1.7.2024.</a:t>
+              <a:t>3.9.2024.</a:t>
             </a:fld>
             <a:endParaRPr lang="sr-Latn-BA"/>
           </a:p>
@@ -1589,7 +1589,7 @@
           <a:p>
             <a:r>
               <a:rPr lang="sr-Cyrl-BA" dirty="0"/>
-              <a:t>Постоје три главна типа машинског учења: надгледано учење, ненадгледано учење и учење у подстицај.</a:t>
+              <a:t>Постоје три главна типа машинског учења: надгледано учење, ненадгледано учење и учење уз подстицај.</a:t>
             </a:r>
             <a:endParaRPr lang="en-US" dirty="0"/>
           </a:p>
@@ -1923,7 +1923,7 @@
           <a:p>
             <a:r>
               <a:rPr lang="sr-Cyrl-BA" dirty="0"/>
-              <a:t>Важно је прецизно дефинисати проблем како би се одабрала одговарајућа методологијаи алгоритми за његово рјешавање.</a:t>
+              <a:t>Важно је прецизно дефинисати проблем како би се одабрала одговарајућа методологија и алгоритми за његово рјешавање.</a:t>
             </a:r>
           </a:p>
           <a:p>
@@ -2158,7 +2158,7 @@
           <a:p>
             <a:r>
               <a:rPr lang="sr-Cyrl-BA" dirty="0"/>
-              <a:t>У овом раду су избачени празни редови, дупликати и редови у којима је број особа у просторији био мањи од нула.  </a:t>
+              <a:t>У овом раду су избачени празни редови дупликати и редови у којима је број особа у просторији био мањи од нула.  </a:t>
             </a:r>
           </a:p>
           <a:p>
@@ -2332,7 +2332,7 @@
             </a:r>
             <a:r>
               <a:rPr lang="sr-Cyrl-BA" dirty="0"/>
-              <a:t> је напредан алгоритам за који користи постепено појачавање</a:t>
+              <a:t> је напредан алгоритам који користи постепено појачавање</a:t>
             </a:r>
             <a:r>
               <a:rPr lang="en-US" dirty="0"/>
@@ -2340,21 +2340,13 @@
             </a:r>
             <a:r>
               <a:rPr lang="sr-Cyrl-BA" dirty="0"/>
-              <a:t>и нуди високу тачност </a:t>
-            </a:r>
-            <a:r>
-              <a:rPr lang="sr-Cyrl-BA"/>
-              <a:t>и брзу </a:t>
-            </a:r>
+              <a:t>и нуди високу тачност и брзу обуку.</a:t>
+            </a:r>
+          </a:p>
+          <a:p>
             <a:r>
               <a:rPr lang="sr-Cyrl-BA" dirty="0"/>
-              <a:t>обуку.</a:t>
-            </a:r>
-          </a:p>
-          <a:p>
-            <a:r>
-              <a:rPr lang="sr-Cyrl-BA" dirty="0"/>
-              <a:t>Сваки од ових модела је тестиран на истом скупу података како би се одредила њихова тачност и ефикасност.</a:t>
+              <a:t>Сваки од ових алгоритама је тестиран на истом скупу података како би се одредила њихова тачност и ефикасност.</a:t>
             </a:r>
             <a:endParaRPr lang="sr-Latn-BA" dirty="0"/>
           </a:p>
@@ -2622,7 +2614,7 @@
           <a:p>
             <a:fld id="{694A021E-8389-4A27-AC52-9AEBB6FACBF4}" type="datetimeFigureOut">
               <a:rPr lang="sr-Latn-BA" smtClean="0"/>
-              <a:t>1.7.2024.</a:t>
+              <a:t>3.9.2024.</a:t>
             </a:fld>
             <a:endParaRPr lang="sr-Latn-BA"/>
           </a:p>
@@ -2830,7 +2822,7 @@
           <a:p>
             <a:fld id="{694A021E-8389-4A27-AC52-9AEBB6FACBF4}" type="datetimeFigureOut">
               <a:rPr lang="sr-Latn-BA" smtClean="0"/>
-              <a:t>1.7.2024.</a:t>
+              <a:t>3.9.2024.</a:t>
             </a:fld>
             <a:endParaRPr lang="sr-Latn-BA"/>
           </a:p>
@@ -3086,7 +3078,7 @@
           <a:p>
             <a:fld id="{694A021E-8389-4A27-AC52-9AEBB6FACBF4}" type="datetimeFigureOut">
               <a:rPr lang="sr-Latn-BA" smtClean="0"/>
-              <a:t>1.7.2024.</a:t>
+              <a:t>3.9.2024.</a:t>
             </a:fld>
             <a:endParaRPr lang="sr-Latn-BA"/>
           </a:p>
@@ -3260,7 +3252,7 @@
           <a:p>
             <a:fld id="{694A021E-8389-4A27-AC52-9AEBB6FACBF4}" type="datetimeFigureOut">
               <a:rPr lang="sr-Latn-BA" smtClean="0"/>
-              <a:t>1.7.2024.</a:t>
+              <a:t>3.9.2024.</a:t>
             </a:fld>
             <a:endParaRPr lang="sr-Latn-BA"/>
           </a:p>
@@ -3603,7 +3595,7 @@
           <a:p>
             <a:fld id="{694A021E-8389-4A27-AC52-9AEBB6FACBF4}" type="datetimeFigureOut">
               <a:rPr lang="sr-Latn-BA" smtClean="0"/>
-              <a:t>1.7.2024.</a:t>
+              <a:t>3.9.2024.</a:t>
             </a:fld>
             <a:endParaRPr lang="sr-Latn-BA"/>
           </a:p>
@@ -3878,7 +3870,7 @@
           <a:p>
             <a:fld id="{694A021E-8389-4A27-AC52-9AEBB6FACBF4}" type="datetimeFigureOut">
               <a:rPr lang="sr-Latn-BA" smtClean="0"/>
-              <a:t>1.7.2024.</a:t>
+              <a:t>3.9.2024.</a:t>
             </a:fld>
             <a:endParaRPr lang="sr-Latn-BA"/>
           </a:p>
@@ -4257,7 +4249,7 @@
           <a:p>
             <a:fld id="{694A021E-8389-4A27-AC52-9AEBB6FACBF4}" type="datetimeFigureOut">
               <a:rPr lang="sr-Latn-BA" smtClean="0"/>
-              <a:t>1.7.2024.</a:t>
+              <a:t>3.9.2024.</a:t>
             </a:fld>
             <a:endParaRPr lang="sr-Latn-BA"/>
           </a:p>
@@ -4375,7 +4367,7 @@
           <a:p>
             <a:fld id="{694A021E-8389-4A27-AC52-9AEBB6FACBF4}" type="datetimeFigureOut">
               <a:rPr lang="sr-Latn-BA" smtClean="0"/>
-              <a:t>1.7.2024.</a:t>
+              <a:t>3.9.2024.</a:t>
             </a:fld>
             <a:endParaRPr lang="sr-Latn-BA"/>
           </a:p>
@@ -4546,7 +4538,7 @@
           <a:p>
             <a:fld id="{694A021E-8389-4A27-AC52-9AEBB6FACBF4}" type="datetimeFigureOut">
               <a:rPr lang="sr-Latn-BA" smtClean="0"/>
-              <a:t>1.7.2024.</a:t>
+              <a:t>3.9.2024.</a:t>
             </a:fld>
             <a:endParaRPr lang="sr-Latn-BA"/>
           </a:p>
@@ -4900,7 +4892,7 @@
           <a:p>
             <a:fld id="{694A021E-8389-4A27-AC52-9AEBB6FACBF4}" type="datetimeFigureOut">
               <a:rPr lang="sr-Latn-BA" smtClean="0"/>
-              <a:t>1.7.2024.</a:t>
+              <a:t>3.9.2024.</a:t>
             </a:fld>
             <a:endParaRPr lang="sr-Latn-BA"/>
           </a:p>
@@ -5282,7 +5274,7 @@
           <a:p>
             <a:fld id="{694A021E-8389-4A27-AC52-9AEBB6FACBF4}" type="datetimeFigureOut">
               <a:rPr lang="sr-Latn-BA" smtClean="0"/>
-              <a:t>1.7.2024.</a:t>
+              <a:t>3.9.2024.</a:t>
             </a:fld>
             <a:endParaRPr lang="sr-Latn-BA"/>
           </a:p>
@@ -5569,7 +5561,7 @@
           <a:p>
             <a:fld id="{694A021E-8389-4A27-AC52-9AEBB6FACBF4}" type="datetimeFigureOut">
               <a:rPr lang="sr-Latn-BA" smtClean="0"/>
-              <a:t>1.7.2024.</a:t>
+              <a:t>3.9.2024.</a:t>
             </a:fld>
             <a:endParaRPr lang="sr-Latn-BA"/>
           </a:p>

</xml_diff>